<commit_message>
Updated mentors and students
</commit_message>
<xml_diff>
--- a/Software Team Roles and Responsibilities.pptx
+++ b/Software Team Roles and Responsibilities.pptx
@@ -162,6 +162,10 @@
 </p:presentation>
 </file>
 
+<file path=ppt/revisionInfo.xml><?xml version="1.0" encoding="utf-8"?>
+<p1510:revInfo xmlns:a="http://schemas.openxmlformats.org/drawingml/2006/main" xmlns:r="http://schemas.openxmlformats.org/officeDocument/2006/relationships" xmlns:p1510="http://schemas.microsoft.com/office/powerpoint/2015/10/main"/>
+</file>
+
 <file path=ppt/handoutMasters/handoutMaster1.xml><?xml version="1.0" encoding="utf-8"?>
 <p:handoutMaster xmlns:a="http://schemas.openxmlformats.org/drawingml/2006/main" xmlns:r="http://schemas.openxmlformats.org/officeDocument/2006/relationships" xmlns:p="http://schemas.openxmlformats.org/presentationml/2006/main">
   <p:cSld>
@@ -614,35 +618,35 @@
           <a:p>
             <a:pPr lvl="0"/>
             <a:r>
-              <a:rPr lang="en-US" noProof="0" smtClean="0"/>
+              <a:rPr lang="en-US" noProof="0"/>
               <a:t>Click to edit Master text styles</a:t>
             </a:r>
           </a:p>
           <a:p>
             <a:pPr lvl="1"/>
             <a:r>
-              <a:rPr lang="en-US" noProof="0" smtClean="0"/>
+              <a:rPr lang="en-US" noProof="0"/>
               <a:t>Second level</a:t>
             </a:r>
           </a:p>
           <a:p>
             <a:pPr lvl="2"/>
             <a:r>
-              <a:rPr lang="en-US" noProof="0" smtClean="0"/>
+              <a:rPr lang="en-US" noProof="0"/>
               <a:t>Third level</a:t>
             </a:r>
           </a:p>
           <a:p>
             <a:pPr lvl="3"/>
             <a:r>
-              <a:rPr lang="en-US" noProof="0" smtClean="0"/>
+              <a:rPr lang="en-US" noProof="0"/>
               <a:t>Fourth level</a:t>
             </a:r>
           </a:p>
           <a:p>
             <a:pPr lvl="4"/>
             <a:r>
-              <a:rPr lang="en-US" noProof="0" smtClean="0"/>
+              <a:rPr lang="en-US" noProof="0"/>
               <a:t>Fifth level</a:t>
             </a:r>
           </a:p>
@@ -972,7 +976,7 @@
           </a:lstStyle>
           <a:p>
             <a:r>
-              <a:rPr lang="en-US" smtClean="0"/>
+              <a:rPr lang="en-US"/>
               <a:t>Click to edit Master subtitle style</a:t>
             </a:r>
           </a:p>
@@ -1003,7 +1007,7 @@
           </a:lstStyle>
           <a:p>
             <a:r>
-              <a:rPr lang="en-US" smtClean="0"/>
+              <a:rPr lang="en-US"/>
               <a:t>Click to edit Master title style</a:t>
             </a:r>
           </a:p>
@@ -1217,13 +1221,6 @@
   <p:clrMapOvr>
     <a:masterClrMapping/>
   </p:clrMapOvr>
-  <p:timing>
-    <p:tnLst>
-      <p:par>
-        <p:cTn id="1" dur="indefinite" restart="never" nodeType="tmRoot"/>
-      </p:par>
-    </p:tnLst>
-  </p:timing>
 </p:sldLayout>
 </file>
 
@@ -1260,10 +1257,9 @@
           <a:lstStyle/>
           <a:p>
             <a:r>
-              <a:rPr lang="en-US" smtClean="0"/>
+              <a:rPr lang="en-US"/>
               <a:t>Click to edit Master title style</a:t>
             </a:r>
-            <a:endParaRPr lang="en-US"/>
           </a:p>
         </p:txBody>
       </p:sp>
@@ -1284,38 +1280,37 @@
           <a:p>
             <a:pPr lvl="0"/>
             <a:r>
-              <a:rPr lang="en-US" smtClean="0"/>
+              <a:rPr lang="en-US"/>
               <a:t>Click to edit Master text styles</a:t>
             </a:r>
           </a:p>
           <a:p>
             <a:pPr lvl="1"/>
             <a:r>
-              <a:rPr lang="en-US" smtClean="0"/>
+              <a:rPr lang="en-US"/>
               <a:t>Second level</a:t>
             </a:r>
           </a:p>
           <a:p>
             <a:pPr lvl="2"/>
             <a:r>
-              <a:rPr lang="en-US" smtClean="0"/>
+              <a:rPr lang="en-US"/>
               <a:t>Third level</a:t>
             </a:r>
           </a:p>
           <a:p>
             <a:pPr lvl="3"/>
             <a:r>
-              <a:rPr lang="en-US" smtClean="0"/>
+              <a:rPr lang="en-US"/>
               <a:t>Fourth level</a:t>
             </a:r>
           </a:p>
           <a:p>
             <a:pPr lvl="4"/>
             <a:r>
-              <a:rPr lang="en-US" smtClean="0"/>
+              <a:rPr lang="en-US"/>
               <a:t>Fifth level</a:t>
             </a:r>
-            <a:endParaRPr lang="en-US"/>
           </a:p>
         </p:txBody>
       </p:sp>
@@ -1365,10 +1360,9 @@
           <a:lstStyle/>
           <a:p>
             <a:r>
-              <a:rPr lang="en-US" smtClean="0"/>
+              <a:rPr lang="en-US"/>
               <a:t>Click to edit Master title style</a:t>
             </a:r>
-            <a:endParaRPr lang="en-US"/>
           </a:p>
         </p:txBody>
       </p:sp>
@@ -1394,38 +1388,37 @@
           <a:p>
             <a:pPr lvl="0"/>
             <a:r>
-              <a:rPr lang="en-US" smtClean="0"/>
+              <a:rPr lang="en-US"/>
               <a:t>Click to edit Master text styles</a:t>
             </a:r>
           </a:p>
           <a:p>
             <a:pPr lvl="1"/>
             <a:r>
-              <a:rPr lang="en-US" smtClean="0"/>
+              <a:rPr lang="en-US"/>
               <a:t>Second level</a:t>
             </a:r>
           </a:p>
           <a:p>
             <a:pPr lvl="2"/>
             <a:r>
-              <a:rPr lang="en-US" smtClean="0"/>
+              <a:rPr lang="en-US"/>
               <a:t>Third level</a:t>
             </a:r>
           </a:p>
           <a:p>
             <a:pPr lvl="3"/>
             <a:r>
-              <a:rPr lang="en-US" smtClean="0"/>
+              <a:rPr lang="en-US"/>
               <a:t>Fourth level</a:t>
             </a:r>
           </a:p>
           <a:p>
             <a:pPr lvl="4"/>
             <a:r>
-              <a:rPr lang="en-US" smtClean="0"/>
+              <a:rPr lang="en-US"/>
               <a:t>Fifth level</a:t>
             </a:r>
-            <a:endParaRPr lang="en-US"/>
           </a:p>
         </p:txBody>
       </p:sp>
@@ -1470,10 +1463,9 @@
           <a:lstStyle/>
           <a:p>
             <a:r>
-              <a:rPr lang="en-US" smtClean="0"/>
+              <a:rPr lang="en-US"/>
               <a:t>Click to edit Master title style</a:t>
             </a:r>
-            <a:endParaRPr lang="en-US"/>
           </a:p>
         </p:txBody>
       </p:sp>
@@ -1494,38 +1486,37 @@
           <a:p>
             <a:pPr lvl="0"/>
             <a:r>
-              <a:rPr lang="en-US" smtClean="0"/>
+              <a:rPr lang="en-US"/>
               <a:t>Click to edit Master text styles</a:t>
             </a:r>
           </a:p>
           <a:p>
             <a:pPr lvl="1"/>
             <a:r>
-              <a:rPr lang="en-US" smtClean="0"/>
+              <a:rPr lang="en-US"/>
               <a:t>Second level</a:t>
             </a:r>
           </a:p>
           <a:p>
             <a:pPr lvl="2"/>
             <a:r>
-              <a:rPr lang="en-US" smtClean="0"/>
+              <a:rPr lang="en-US"/>
               <a:t>Third level</a:t>
             </a:r>
           </a:p>
           <a:p>
             <a:pPr lvl="3"/>
             <a:r>
-              <a:rPr lang="en-US" smtClean="0"/>
+              <a:rPr lang="en-US"/>
               <a:t>Fourth level</a:t>
             </a:r>
           </a:p>
           <a:p>
             <a:pPr lvl="4"/>
             <a:r>
-              <a:rPr lang="en-US" smtClean="0"/>
+              <a:rPr lang="en-US"/>
               <a:t>Fifth level</a:t>
             </a:r>
-            <a:endParaRPr lang="en-US"/>
           </a:p>
         </p:txBody>
       </p:sp>
@@ -1579,10 +1570,9 @@
           </a:lstStyle>
           <a:p>
             <a:r>
-              <a:rPr lang="en-US" dirty="0" smtClean="0"/>
+              <a:rPr lang="en-US" dirty="0"/>
               <a:t>Click to edit Master title style</a:t>
             </a:r>
-            <a:endParaRPr lang="en-US" dirty="0"/>
           </a:p>
         </p:txBody>
       </p:sp>
@@ -1645,7 +1635,7 @@
           <a:p>
             <a:pPr lvl="0"/>
             <a:r>
-              <a:rPr lang="en-US" dirty="0" smtClean="0"/>
+              <a:rPr lang="en-US" dirty="0"/>
               <a:t>Click to edit Master text styles</a:t>
             </a:r>
           </a:p>
@@ -1692,10 +1682,9 @@
           <a:lstStyle/>
           <a:p>
             <a:r>
-              <a:rPr lang="en-US" dirty="0" smtClean="0"/>
+              <a:rPr lang="en-US" dirty="0"/>
               <a:t>Click to edit Master title style</a:t>
             </a:r>
-            <a:endParaRPr lang="en-US" dirty="0"/>
           </a:p>
         </p:txBody>
       </p:sp>
@@ -1749,38 +1738,37 @@
           <a:p>
             <a:pPr lvl="0"/>
             <a:r>
-              <a:rPr lang="en-US" dirty="0" smtClean="0"/>
+              <a:rPr lang="en-US" dirty="0"/>
               <a:t>Click to edit Master text styles</a:t>
             </a:r>
           </a:p>
           <a:p>
             <a:pPr lvl="1"/>
             <a:r>
-              <a:rPr lang="en-US" dirty="0" smtClean="0"/>
+              <a:rPr lang="en-US" dirty="0"/>
               <a:t>Second level</a:t>
             </a:r>
           </a:p>
           <a:p>
             <a:pPr lvl="2"/>
             <a:r>
-              <a:rPr lang="en-US" dirty="0" smtClean="0"/>
+              <a:rPr lang="en-US" dirty="0"/>
               <a:t>Third level</a:t>
             </a:r>
           </a:p>
           <a:p>
             <a:pPr lvl="3"/>
             <a:r>
-              <a:rPr lang="en-US" dirty="0" smtClean="0"/>
+              <a:rPr lang="en-US" dirty="0"/>
               <a:t>Fourth level</a:t>
             </a:r>
           </a:p>
           <a:p>
             <a:pPr lvl="4"/>
             <a:r>
-              <a:rPr lang="en-US" dirty="0" smtClean="0"/>
+              <a:rPr lang="en-US" dirty="0"/>
               <a:t>Fifth level</a:t>
             </a:r>
-            <a:endParaRPr lang="en-US" dirty="0"/>
           </a:p>
         </p:txBody>
       </p:sp>
@@ -1834,38 +1822,37 @@
           <a:p>
             <a:pPr lvl="0"/>
             <a:r>
-              <a:rPr lang="en-US" dirty="0" smtClean="0"/>
+              <a:rPr lang="en-US" dirty="0"/>
               <a:t>Click to edit Master text styles</a:t>
             </a:r>
           </a:p>
           <a:p>
             <a:pPr lvl="1"/>
             <a:r>
-              <a:rPr lang="en-US" dirty="0" smtClean="0"/>
+              <a:rPr lang="en-US" dirty="0"/>
               <a:t>Second level</a:t>
             </a:r>
           </a:p>
           <a:p>
             <a:pPr lvl="2"/>
             <a:r>
-              <a:rPr lang="en-US" dirty="0" smtClean="0"/>
+              <a:rPr lang="en-US" dirty="0"/>
               <a:t>Third level</a:t>
             </a:r>
           </a:p>
           <a:p>
             <a:pPr lvl="3"/>
             <a:r>
-              <a:rPr lang="en-US" dirty="0" smtClean="0"/>
+              <a:rPr lang="en-US" dirty="0"/>
               <a:t>Fourth level</a:t>
             </a:r>
           </a:p>
           <a:p>
             <a:pPr lvl="4"/>
             <a:r>
-              <a:rPr lang="en-US" dirty="0" smtClean="0"/>
+              <a:rPr lang="en-US" dirty="0"/>
               <a:t>Fifth level</a:t>
             </a:r>
-            <a:endParaRPr lang="en-US" dirty="0"/>
           </a:p>
         </p:txBody>
       </p:sp>
@@ -1919,10 +1906,9 @@
           </a:lstStyle>
           <a:p>
             <a:r>
-              <a:rPr lang="en-US" smtClean="0"/>
+              <a:rPr lang="en-US"/>
               <a:t>Click to edit Master title style</a:t>
             </a:r>
-            <a:endParaRPr lang="en-US"/>
           </a:p>
         </p:txBody>
       </p:sp>
@@ -1985,7 +1971,7 @@
           <a:p>
             <a:pPr lvl="0"/>
             <a:r>
-              <a:rPr lang="en-US" smtClean="0"/>
+              <a:rPr lang="en-US"/>
               <a:t>Click to edit Master text styles</a:t>
             </a:r>
           </a:p>
@@ -2041,38 +2027,37 @@
           <a:p>
             <a:pPr lvl="0"/>
             <a:r>
-              <a:rPr lang="en-US" smtClean="0"/>
+              <a:rPr lang="en-US"/>
               <a:t>Click to edit Master text styles</a:t>
             </a:r>
           </a:p>
           <a:p>
             <a:pPr lvl="1"/>
             <a:r>
-              <a:rPr lang="en-US" smtClean="0"/>
+              <a:rPr lang="en-US"/>
               <a:t>Second level</a:t>
             </a:r>
           </a:p>
           <a:p>
             <a:pPr lvl="2"/>
             <a:r>
-              <a:rPr lang="en-US" smtClean="0"/>
+              <a:rPr lang="en-US"/>
               <a:t>Third level</a:t>
             </a:r>
           </a:p>
           <a:p>
             <a:pPr lvl="3"/>
             <a:r>
-              <a:rPr lang="en-US" smtClean="0"/>
+              <a:rPr lang="en-US"/>
               <a:t>Fourth level</a:t>
             </a:r>
           </a:p>
           <a:p>
             <a:pPr lvl="4"/>
             <a:r>
-              <a:rPr lang="en-US" smtClean="0"/>
+              <a:rPr lang="en-US"/>
               <a:t>Fifth level</a:t>
             </a:r>
-            <a:endParaRPr lang="en-US"/>
           </a:p>
         </p:txBody>
       </p:sp>
@@ -2135,7 +2120,7 @@
           <a:p>
             <a:pPr lvl="0"/>
             <a:r>
-              <a:rPr lang="en-US" smtClean="0"/>
+              <a:rPr lang="en-US"/>
               <a:t>Click to edit Master text styles</a:t>
             </a:r>
           </a:p>
@@ -2191,38 +2176,37 @@
           <a:p>
             <a:pPr lvl="0"/>
             <a:r>
-              <a:rPr lang="en-US" smtClean="0"/>
+              <a:rPr lang="en-US"/>
               <a:t>Click to edit Master text styles</a:t>
             </a:r>
           </a:p>
           <a:p>
             <a:pPr lvl="1"/>
             <a:r>
-              <a:rPr lang="en-US" smtClean="0"/>
+              <a:rPr lang="en-US"/>
               <a:t>Second level</a:t>
             </a:r>
           </a:p>
           <a:p>
             <a:pPr lvl="2"/>
             <a:r>
-              <a:rPr lang="en-US" smtClean="0"/>
+              <a:rPr lang="en-US"/>
               <a:t>Third level</a:t>
             </a:r>
           </a:p>
           <a:p>
             <a:pPr lvl="3"/>
             <a:r>
-              <a:rPr lang="en-US" smtClean="0"/>
+              <a:rPr lang="en-US"/>
               <a:t>Fourth level</a:t>
             </a:r>
           </a:p>
           <a:p>
             <a:pPr lvl="4"/>
             <a:r>
-              <a:rPr lang="en-US" smtClean="0"/>
+              <a:rPr lang="en-US"/>
               <a:t>Fifth level</a:t>
             </a:r>
-            <a:endParaRPr lang="en-US"/>
           </a:p>
         </p:txBody>
       </p:sp>
@@ -2231,13 +2215,6 @@
   <p:clrMapOvr>
     <a:masterClrMapping/>
   </p:clrMapOvr>
-  <p:timing>
-    <p:tnLst>
-      <p:par>
-        <p:cTn id="1" dur="indefinite" restart="never" nodeType="tmRoot"/>
-      </p:par>
-    </p:tnLst>
-  </p:timing>
 </p:sldLayout>
 </file>
 
@@ -2274,10 +2251,9 @@
           <a:lstStyle/>
           <a:p>
             <a:r>
-              <a:rPr lang="en-US" smtClean="0"/>
+              <a:rPr lang="en-US"/>
               <a:t>Click to edit Master title style</a:t>
             </a:r>
-            <a:endParaRPr lang="en-US"/>
           </a:p>
         </p:txBody>
       </p:sp>
@@ -2356,10 +2332,9 @@
           </a:lstStyle>
           <a:p>
             <a:r>
-              <a:rPr lang="en-US" smtClean="0"/>
+              <a:rPr lang="en-US"/>
               <a:t>Click to edit Master title style</a:t>
             </a:r>
-            <a:endParaRPr lang="en-US"/>
           </a:p>
         </p:txBody>
       </p:sp>
@@ -2413,38 +2388,37 @@
           <a:p>
             <a:pPr lvl="0"/>
             <a:r>
-              <a:rPr lang="en-US" smtClean="0"/>
+              <a:rPr lang="en-US"/>
               <a:t>Click to edit Master text styles</a:t>
             </a:r>
           </a:p>
           <a:p>
             <a:pPr lvl="1"/>
             <a:r>
-              <a:rPr lang="en-US" smtClean="0"/>
+              <a:rPr lang="en-US"/>
               <a:t>Second level</a:t>
             </a:r>
           </a:p>
           <a:p>
             <a:pPr lvl="2"/>
             <a:r>
-              <a:rPr lang="en-US" smtClean="0"/>
+              <a:rPr lang="en-US"/>
               <a:t>Third level</a:t>
             </a:r>
           </a:p>
           <a:p>
             <a:pPr lvl="3"/>
             <a:r>
-              <a:rPr lang="en-US" smtClean="0"/>
+              <a:rPr lang="en-US"/>
               <a:t>Fourth level</a:t>
             </a:r>
           </a:p>
           <a:p>
             <a:pPr lvl="4"/>
             <a:r>
-              <a:rPr lang="en-US" smtClean="0"/>
+              <a:rPr lang="en-US"/>
               <a:t>Fifth level</a:t>
             </a:r>
-            <a:endParaRPr lang="en-US"/>
           </a:p>
         </p:txBody>
       </p:sp>
@@ -2507,7 +2481,7 @@
           <a:p>
             <a:pPr lvl="0"/>
             <a:r>
-              <a:rPr lang="en-US" smtClean="0"/>
+              <a:rPr lang="en-US"/>
               <a:t>Click to edit Master text styles</a:t>
             </a:r>
           </a:p>
@@ -2563,10 +2537,9 @@
           </a:lstStyle>
           <a:p>
             <a:r>
-              <a:rPr lang="en-US" smtClean="0"/>
+              <a:rPr lang="en-US"/>
               <a:t>Click to edit Master title style</a:t>
             </a:r>
-            <a:endParaRPr lang="en-US"/>
           </a:p>
         </p:txBody>
       </p:sp>
@@ -2691,7 +2664,7 @@
           <a:p>
             <a:pPr lvl="0"/>
             <a:r>
-              <a:rPr lang="en-US" smtClean="0"/>
+              <a:rPr lang="en-US"/>
               <a:t>Click to edit Master text styles</a:t>
             </a:r>
           </a:p>
@@ -2800,35 +2773,35 @@
           <a:p>
             <a:pPr lvl="0"/>
             <a:r>
-              <a:rPr lang="en-GB" altLang="en-GB" smtClean="0"/>
+              <a:rPr lang="en-GB" altLang="en-GB"/>
               <a:t>Click to edit Master text styles 20 Arial</a:t>
             </a:r>
           </a:p>
           <a:p>
             <a:pPr lvl="1"/>
             <a:r>
-              <a:rPr lang="en-GB" altLang="en-GB" smtClean="0"/>
+              <a:rPr lang="en-GB" altLang="en-GB"/>
               <a:t>Second level 18 Arial</a:t>
             </a:r>
           </a:p>
           <a:p>
             <a:pPr lvl="2"/>
             <a:r>
-              <a:rPr lang="en-GB" altLang="en-GB" smtClean="0"/>
+              <a:rPr lang="en-GB" altLang="en-GB"/>
               <a:t>Third level 18 Arial</a:t>
             </a:r>
           </a:p>
           <a:p>
             <a:pPr lvl="3"/>
             <a:r>
-              <a:rPr lang="en-GB" altLang="en-GB" smtClean="0"/>
+              <a:rPr lang="en-GB" altLang="en-GB"/>
               <a:t>Fourth level 16 Arial</a:t>
             </a:r>
           </a:p>
           <a:p>
             <a:pPr lvl="4"/>
             <a:r>
-              <a:rPr lang="en-GB" altLang="en-GB" smtClean="0"/>
+              <a:rPr lang="en-GB" altLang="en-GB"/>
               <a:t>Fifth level 16 Arial</a:t>
             </a:r>
           </a:p>
@@ -2870,7 +2843,7 @@
           <a:p>
             <a:pPr lvl="0"/>
             <a:r>
-              <a:rPr lang="en-GB" altLang="en-GB" smtClean="0"/>
+              <a:rPr lang="en-GB" altLang="en-GB"/>
               <a:t>Click to edit Master title style – 22 Arial Bold</a:t>
             </a:r>
           </a:p>
@@ -3063,13 +3036,6 @@
     <p:sldLayoutId id="2147483689" r:id="rId10"/>
     <p:sldLayoutId id="2147483690" r:id="rId11"/>
   </p:sldLayoutIdLst>
-  <p:timing>
-    <p:tnLst>
-      <p:par>
-        <p:cTn id="1" dur="indefinite" restart="never" nodeType="tmRoot"/>
-      </p:par>
-    </p:tnLst>
-  </p:timing>
   <p:txStyles>
     <p:titleStyle>
       <a:lvl1pPr algn="l" rtl="0" eaLnBrk="0" fontAlgn="base" hangingPunct="0">
@@ -3475,10 +3441,9 @@
           <a:lstStyle/>
           <a:p>
             <a:r>
-              <a:rPr lang="en-US" dirty="0" smtClean="0"/>
+              <a:rPr lang="en-US" dirty="0"/>
               <a:t>Software Team Roles &amp; Responsibilities</a:t>
             </a:r>
-            <a:endParaRPr lang="en-US" dirty="0"/>
           </a:p>
         </p:txBody>
       </p:sp>
@@ -3491,7 +3456,7 @@
           <p:nvPr>
             <p:extLst>
               <p:ext uri="{D42A27DB-BD31-4B8C-83A1-F6EECF244321}">
-                <p14:modId xmlns:p14="http://schemas.microsoft.com/office/powerpoint/2010/main" val="3161167475"/>
+                <p14:modId xmlns:p14="http://schemas.microsoft.com/office/powerpoint/2010/main" val="2848295500"/>
               </p:ext>
             </p:extLst>
           </p:nvPr>
@@ -3507,10 +3472,34 @@
                 <a:tableStyleId>{5C22544A-7EE6-4342-B048-85BDC9FD1C3A}</a:tableStyleId>
               </a:tblPr>
               <a:tblGrid>
-                <a:gridCol w="1645920"/>
-                <a:gridCol w="4297680"/>
-                <a:gridCol w="1554480"/>
-                <a:gridCol w="1554480"/>
+                <a:gridCol w="1645920">
+                  <a:extLst>
+                    <a:ext uri="{9D8B030D-6E8A-4147-A177-3AD203B41FA5}">
+                      <a16:colId xmlns:a16="http://schemas.microsoft.com/office/drawing/2014/main" val="20000"/>
+                    </a:ext>
+                  </a:extLst>
+                </a:gridCol>
+                <a:gridCol w="4297680">
+                  <a:extLst>
+                    <a:ext uri="{9D8B030D-6E8A-4147-A177-3AD203B41FA5}">
+                      <a16:colId xmlns:a16="http://schemas.microsoft.com/office/drawing/2014/main" val="20001"/>
+                    </a:ext>
+                  </a:extLst>
+                </a:gridCol>
+                <a:gridCol w="1554480">
+                  <a:extLst>
+                    <a:ext uri="{9D8B030D-6E8A-4147-A177-3AD203B41FA5}">
+                      <a16:colId xmlns:a16="http://schemas.microsoft.com/office/drawing/2014/main" val="20002"/>
+                    </a:ext>
+                  </a:extLst>
+                </a:gridCol>
+                <a:gridCol w="1554480">
+                  <a:extLst>
+                    <a:ext uri="{9D8B030D-6E8A-4147-A177-3AD203B41FA5}">
+                      <a16:colId xmlns:a16="http://schemas.microsoft.com/office/drawing/2014/main" val="20003"/>
+                    </a:ext>
+                  </a:extLst>
+                </a:gridCol>
               </a:tblGrid>
               <a:tr h="370840">
                 <a:tc>
@@ -3520,10 +3509,9 @@
                     <a:p>
                       <a:pPr algn="ctr"/>
                       <a:r>
-                        <a:rPr lang="en-US" sz="1800" b="1" i="1" dirty="0" smtClean="0"/>
+                        <a:rPr lang="en-US" sz="1800" b="1" i="1" dirty="0"/>
                         <a:t>Functional Element</a:t>
                       </a:r>
-                      <a:endParaRPr lang="en-US" sz="1800" b="1" i="1" dirty="0"/>
                     </a:p>
                   </a:txBody>
                   <a:tcPr anchor="ctr"/>
@@ -3535,10 +3523,9 @@
                     <a:p>
                       <a:pPr algn="ctr"/>
                       <a:r>
-                        <a:rPr lang="en-US" sz="1800" b="1" i="1" dirty="0" smtClean="0"/>
+                        <a:rPr lang="en-US" sz="1800" b="1" i="1" dirty="0"/>
                         <a:t>Description</a:t>
                       </a:r>
-                      <a:endParaRPr lang="en-US" sz="1800" b="1" i="1" dirty="0"/>
                     </a:p>
                   </a:txBody>
                   <a:tcPr anchor="ctr"/>
@@ -3550,10 +3537,9 @@
                     <a:p>
                       <a:pPr algn="ctr"/>
                       <a:r>
-                        <a:rPr lang="en-US" sz="1800" b="1" i="1" dirty="0" smtClean="0"/>
+                        <a:rPr lang="en-US" sz="1800" b="1" i="1" dirty="0"/>
                         <a:t>Mentor(s)</a:t>
                       </a:r>
-                      <a:endParaRPr lang="en-US" sz="1800" b="1" i="1" dirty="0"/>
                     </a:p>
                   </a:txBody>
                   <a:tcPr anchor="ctr"/>
@@ -3565,14 +3551,18 @@
                     <a:p>
                       <a:pPr algn="ctr"/>
                       <a:r>
-                        <a:rPr lang="en-US" sz="1800" b="1" i="1" dirty="0" smtClean="0"/>
+                        <a:rPr lang="en-US" sz="1800" b="1" i="1" dirty="0"/>
                         <a:t>Students</a:t>
                       </a:r>
-                      <a:endParaRPr lang="en-US" sz="1800" b="1" i="1" dirty="0"/>
                     </a:p>
                   </a:txBody>
                   <a:tcPr anchor="ctr"/>
                 </a:tc>
+                <a:extLst>
+                  <a:ext uri="{0D108BD9-81ED-4DB2-BD59-A6C34878D82A}">
+                    <a16:rowId xmlns:a16="http://schemas.microsoft.com/office/drawing/2014/main" val="10000"/>
+                  </a:ext>
+                </a:extLst>
               </a:tr>
               <a:tr h="370840">
                 <a:tc>
@@ -3582,10 +3572,9 @@
                     <a:p>
                       <a:pPr algn="ctr"/>
                       <a:r>
-                        <a:rPr lang="en-US" sz="1600" b="1" i="1" dirty="0" smtClean="0"/>
+                        <a:rPr lang="en-US" sz="1600" b="1" i="1" dirty="0"/>
                         <a:t>Architecture</a:t>
                       </a:r>
-                      <a:endParaRPr lang="en-US" sz="1600" b="1" i="1" dirty="0"/>
                     </a:p>
                   </a:txBody>
                   <a:tcPr anchor="ctr"/>
@@ -3597,17 +3586,16 @@
                     <a:p>
                       <a:pPr algn="ctr"/>
                       <a:r>
-                        <a:rPr lang="en-US" sz="1600" b="1" i="1" dirty="0" smtClean="0"/>
+                        <a:rPr lang="en-US" sz="1600" b="1" i="1" dirty="0"/>
                         <a:t>Define Requirements</a:t>
                       </a:r>
                     </a:p>
                     <a:p>
                       <a:pPr algn="ctr"/>
                       <a:r>
-                        <a:rPr lang="en-US" sz="1600" b="1" i="1" dirty="0" smtClean="0"/>
+                        <a:rPr lang="en-US" sz="1600" b="1" i="1" dirty="0"/>
                         <a:t>Integration &amp; Test</a:t>
                       </a:r>
-                      <a:endParaRPr lang="en-US" sz="1600" b="1" i="1" dirty="0"/>
                     </a:p>
                   </a:txBody>
                   <a:tcPr anchor="ctr"/>
@@ -3619,10 +3607,9 @@
                     <a:p>
                       <a:pPr algn="ctr"/>
                       <a:r>
-                        <a:rPr lang="en-US" sz="1200" b="1" i="1" dirty="0" smtClean="0"/>
+                        <a:rPr lang="en-US" sz="1200" b="1" i="1" dirty="0"/>
                         <a:t>John Foster</a:t>
                       </a:r>
-                      <a:endParaRPr lang="en-US" sz="1200" b="1" i="1" dirty="0"/>
                     </a:p>
                   </a:txBody>
                   <a:tcPr anchor="ctr"/>
@@ -3638,6 +3625,11 @@
                   </a:txBody>
                   <a:tcPr anchor="ctr"/>
                 </a:tc>
+                <a:extLst>
+                  <a:ext uri="{0D108BD9-81ED-4DB2-BD59-A6C34878D82A}">
+                    <a16:rowId xmlns:a16="http://schemas.microsoft.com/office/drawing/2014/main" val="10001"/>
+                  </a:ext>
+                </a:extLst>
               </a:tr>
               <a:tr h="370840">
                 <a:tc>
@@ -3647,14 +3639,14 @@
                     <a:p>
                       <a:pPr algn="ctr"/>
                       <a:r>
-                        <a:rPr lang="en-US" sz="1600" b="1" i="1" dirty="0" smtClean="0"/>
+                        <a:rPr lang="en-US" sz="1600" b="1" i="1" dirty="0"/>
                         <a:t>Drive </a:t>
                       </a:r>
                     </a:p>
                     <a:p>
                       <a:pPr algn="ctr"/>
                       <a:r>
-                        <a:rPr lang="en-US" sz="1600" b="1" i="1" dirty="0" smtClean="0"/>
+                        <a:rPr lang="en-US" sz="1600" b="1" i="1" dirty="0"/>
                         <a:t>Control</a:t>
                       </a:r>
                     </a:p>
@@ -3668,18 +3660,18 @@
                     <a:p>
                       <a:pPr algn="ctr"/>
                       <a:r>
-                        <a:rPr lang="en-US" sz="1600" b="1" i="1" dirty="0" smtClean="0"/>
+                        <a:rPr lang="en-US" sz="1600" b="1" i="1" dirty="0"/>
                         <a:t>Drive Control</a:t>
                       </a:r>
                       <a:r>
-                        <a:rPr lang="en-US" sz="1600" b="1" i="1" baseline="0" dirty="0" smtClean="0"/>
+                        <a:rPr lang="en-US" sz="1600" b="1" i="1" baseline="0" dirty="0"/>
                         <a:t> S/W </a:t>
                       </a:r>
                     </a:p>
                     <a:p>
                       <a:pPr algn="ctr"/>
                       <a:r>
-                        <a:rPr lang="en-US" sz="1600" b="1" i="1" baseline="0" dirty="0" smtClean="0"/>
+                        <a:rPr lang="en-US" sz="1600" b="1" i="1" baseline="0" dirty="0"/>
                         <a:t>Driver Controller Interface</a:t>
                       </a:r>
                     </a:p>
@@ -3693,11 +3685,11 @@
                     <a:p>
                       <a:pPr algn="ctr"/>
                       <a:r>
-                        <a:rPr lang="en-US" sz="1200" b="1" i="1" smtClean="0"/>
+                        <a:rPr lang="en-US" sz="1200" b="1" i="1"/>
                         <a:t>Brad</a:t>
                       </a:r>
                       <a:r>
-                        <a:rPr lang="en-US" sz="1200" b="1" i="1" baseline="0" smtClean="0"/>
+                        <a:rPr lang="en-US" sz="1200" b="1" i="1" baseline="0"/>
                         <a:t> Hunter</a:t>
                       </a:r>
                       <a:endParaRPr lang="en-US" sz="1200" b="1" i="1" dirty="0"/>
@@ -3716,6 +3708,11 @@
                   </a:txBody>
                   <a:tcPr anchor="ctr"/>
                 </a:tc>
+                <a:extLst>
+                  <a:ext uri="{0D108BD9-81ED-4DB2-BD59-A6C34878D82A}">
+                    <a16:rowId xmlns:a16="http://schemas.microsoft.com/office/drawing/2014/main" val="10002"/>
+                  </a:ext>
+                </a:extLst>
               </a:tr>
               <a:tr h="370840">
                 <a:tc>
@@ -3725,38 +3722,32 @@
                     <a:p>
                       <a:pPr algn="ctr"/>
                       <a:r>
-                        <a:rPr lang="en-US" sz="1600" b="1" i="1" dirty="0" smtClean="0"/>
+                        <a:rPr lang="en-US" sz="1600" b="1" i="1" dirty="0"/>
                         <a:t>Scoring</a:t>
                       </a:r>
                       <a:r>
-                        <a:rPr lang="en-US" sz="1600" b="1" i="1" baseline="0" dirty="0" smtClean="0"/>
-                        <a:t> </a:t>
+                        <a:rPr lang="en-US" sz="1600" b="1" i="1" baseline="0" dirty="0"/>
+                        <a:t> Object </a:t>
                       </a:r>
                       <a:r>
-                        <a:rPr lang="en-US" sz="1600" b="1" i="1" baseline="0" dirty="0" smtClean="0"/>
-                        <a:t>Object </a:t>
-                      </a:r>
-                      <a:r>
-                        <a:rPr lang="en-US" sz="1600" b="1" i="1" dirty="0" smtClean="0"/>
+                        <a:rPr lang="en-US" sz="1600" b="1" i="1" dirty="0"/>
                         <a:t>Manipulation </a:t>
                       </a:r>
-                      <a:endParaRPr lang="en-US" sz="1600" b="1" i="1" dirty="0" smtClean="0"/>
                     </a:p>
                     <a:p>
                       <a:pPr algn="ctr"/>
                       <a:r>
-                        <a:rPr lang="en-US" sz="1600" b="1" i="1" dirty="0" smtClean="0"/>
+                        <a:rPr lang="en-US" sz="1600" b="1" i="1" dirty="0"/>
                         <a:t>&amp;</a:t>
                       </a:r>
                       <a:r>
-                        <a:rPr lang="en-US" sz="1600" b="1" i="1" baseline="0" dirty="0" smtClean="0"/>
+                        <a:rPr lang="en-US" sz="1600" b="1" i="1" baseline="0" dirty="0"/>
                         <a:t> End Game </a:t>
                       </a:r>
                       <a:r>
-                        <a:rPr lang="en-US" sz="1600" b="1" i="1" dirty="0" smtClean="0"/>
+                        <a:rPr lang="en-US" sz="1600" b="1" i="1" dirty="0"/>
                         <a:t>Control</a:t>
                       </a:r>
-                      <a:endParaRPr lang="en-US" sz="1600" b="1" i="1" dirty="0"/>
                     </a:p>
                   </a:txBody>
                   <a:tcPr anchor="ctr"/>
@@ -3768,37 +3759,36 @@
                     <a:p>
                       <a:pPr algn="ctr"/>
                       <a:r>
-                        <a:rPr lang="en-US" sz="1600" b="1" i="1" dirty="0" smtClean="0"/>
+                        <a:rPr lang="en-US" sz="1600" b="1" i="1" dirty="0"/>
                         <a:t>Articulation Control </a:t>
                       </a:r>
                       <a:r>
-                        <a:rPr lang="en-US" sz="1600" b="1" i="1" smtClean="0"/>
+                        <a:rPr lang="en-US" sz="1600" b="1" i="1"/>
                         <a:t>S/W </a:t>
                       </a:r>
                     </a:p>
                     <a:p>
                       <a:pPr algn="ctr"/>
                       <a:r>
-                        <a:rPr lang="en-US" sz="1600" b="1" i="1" smtClean="0"/>
+                        <a:rPr lang="en-US" sz="1600" b="1" i="1"/>
                         <a:t>(</a:t>
                       </a:r>
                       <a:r>
-                        <a:rPr lang="en-US" sz="1600" b="1" i="1" dirty="0" smtClean="0"/>
+                        <a:rPr lang="en-US" sz="1600" b="1" i="1" dirty="0"/>
                         <a:t>motor </a:t>
                       </a:r>
                       <a:r>
-                        <a:rPr lang="en-US" sz="1600" b="1" i="1" smtClean="0"/>
+                        <a:rPr lang="en-US" sz="1600" b="1" i="1"/>
                         <a:t>&amp; pneumatic)</a:t>
                       </a:r>
-                      <a:endParaRPr lang="en-US" sz="1600" b="1" i="1" dirty="0" smtClean="0"/>
+                      <a:endParaRPr lang="en-US" sz="1600" b="1" i="1" dirty="0"/>
                     </a:p>
                     <a:p>
                       <a:pPr algn="ctr"/>
                       <a:r>
-                        <a:rPr lang="en-US" sz="1600" b="1" i="1" dirty="0" smtClean="0"/>
+                        <a:rPr lang="en-US" sz="1600" b="1" i="1" dirty="0"/>
                         <a:t>Sensor Processing</a:t>
                       </a:r>
-                      <a:endParaRPr lang="en-US" sz="1600" b="1" i="1" dirty="0"/>
                     </a:p>
                   </a:txBody>
                   <a:tcPr anchor="ctr"/>
@@ -3810,11 +3800,11 @@
                     <a:p>
                       <a:pPr algn="ctr"/>
                       <a:r>
-                        <a:rPr lang="en-US" sz="1200" b="1" i="1" dirty="0" smtClean="0"/>
+                        <a:rPr lang="en-US" sz="1200" b="1" i="1" dirty="0"/>
                         <a:t>Jim </a:t>
                       </a:r>
                       <a:r>
-                        <a:rPr lang="en-US" sz="1200" b="1" i="1" dirty="0" err="1" smtClean="0"/>
+                        <a:rPr lang="en-US" sz="1200" b="1" i="1" dirty="0" err="1"/>
                         <a:t>McGinness</a:t>
                       </a:r>
                       <a:endParaRPr lang="en-US" sz="1200" b="1" i="1" dirty="0"/>
@@ -3833,6 +3823,11 @@
                   </a:txBody>
                   <a:tcPr anchor="ctr"/>
                 </a:tc>
+                <a:extLst>
+                  <a:ext uri="{0D108BD9-81ED-4DB2-BD59-A6C34878D82A}">
+                    <a16:rowId xmlns:a16="http://schemas.microsoft.com/office/drawing/2014/main" val="10003"/>
+                  </a:ext>
+                </a:extLst>
               </a:tr>
               <a:tr h="370840">
                 <a:tc>
@@ -3858,7 +3853,7 @@
                         <a:defRPr/>
                       </a:pPr>
                       <a:r>
-                        <a:rPr lang="en-US" sz="1600" b="1" i="1" dirty="0" smtClean="0"/>
+                        <a:rPr lang="en-US" sz="1600" b="1" i="1" dirty="0"/>
                         <a:t>Driver Station Interface</a:t>
                       </a:r>
                     </a:p>
@@ -3888,7 +3883,7 @@
                         <a:defRPr/>
                       </a:pPr>
                       <a:r>
-                        <a:rPr lang="en-US" sz="1600" b="1" i="1" dirty="0" smtClean="0"/>
+                        <a:rPr lang="en-US" sz="1600" b="1" i="1" dirty="0"/>
                         <a:t>Drive &amp; Operator Controller Interface </a:t>
                       </a:r>
                     </a:p>
@@ -3911,7 +3906,7 @@
                         <a:defRPr/>
                       </a:pPr>
                       <a:r>
-                        <a:rPr lang="en-US" sz="1600" b="1" i="1" dirty="0" smtClean="0"/>
+                        <a:rPr lang="en-US" sz="1600" b="1" i="1" dirty="0"/>
                         <a:t>FIRST Log File Customization</a:t>
                       </a:r>
                     </a:p>
@@ -3925,17 +3920,16 @@
                     <a:p>
                       <a:pPr algn="ctr"/>
                       <a:r>
-                        <a:rPr lang="en-US" sz="1200" b="1" i="1" dirty="0" smtClean="0"/>
+                        <a:rPr lang="en-US" sz="1200" b="1" i="1" dirty="0"/>
                         <a:t>John Foster</a:t>
                       </a:r>
                     </a:p>
                     <a:p>
                       <a:pPr algn="ctr"/>
                       <a:r>
-                        <a:rPr lang="en-US" sz="1200" b="1" i="1" dirty="0" smtClean="0"/>
+                        <a:rPr lang="en-US" sz="1200" b="1" i="1" dirty="0"/>
                         <a:t>Jay Hinspeter</a:t>
                       </a:r>
-                      <a:endParaRPr lang="en-US" sz="1200" b="1" i="1" dirty="0"/>
                     </a:p>
                   </a:txBody>
                   <a:tcPr anchor="ctr"/>
@@ -3951,6 +3945,11 @@
                   </a:txBody>
                   <a:tcPr anchor="ctr"/>
                 </a:tc>
+                <a:extLst>
+                  <a:ext uri="{0D108BD9-81ED-4DB2-BD59-A6C34878D82A}">
+                    <a16:rowId xmlns:a16="http://schemas.microsoft.com/office/drawing/2014/main" val="10004"/>
+                  </a:ext>
+                </a:extLst>
               </a:tr>
               <a:tr h="370840">
                 <a:tc>
@@ -3960,10 +3959,9 @@
                     <a:p>
                       <a:pPr algn="ctr"/>
                       <a:r>
-                        <a:rPr lang="en-US" sz="1600" b="1" i="1" dirty="0" smtClean="0"/>
+                        <a:rPr lang="en-US" sz="1600" b="1" i="1" dirty="0"/>
                         <a:t>Vision Processing</a:t>
                       </a:r>
-                      <a:endParaRPr lang="en-US" sz="1600" b="1" i="1" dirty="0"/>
                     </a:p>
                   </a:txBody>
                   <a:tcPr anchor="ctr"/>
@@ -3991,7 +3989,7 @@
                         <a:defRPr/>
                       </a:pPr>
                       <a:r>
-                        <a:rPr lang="en-US" sz="1600" b="1" i="1" dirty="0" smtClean="0"/>
+                        <a:rPr lang="en-US" sz="1600" b="1" i="1" dirty="0"/>
                         <a:t>Vision Target Recognition</a:t>
                       </a:r>
                     </a:p>
@@ -4014,7 +4012,7 @@
                         <a:defRPr/>
                       </a:pPr>
                       <a:r>
-                        <a:rPr lang="en-US" sz="1600" b="1" i="1" dirty="0" smtClean="0"/>
+                        <a:rPr lang="en-US" sz="1600" b="1" i="1" dirty="0"/>
                         <a:t>Target Ranging Processing</a:t>
                       </a:r>
                     </a:p>
@@ -4037,7 +4035,7 @@
                         <a:defRPr/>
                       </a:pPr>
                       <a:r>
-                        <a:rPr lang="en-US" sz="1600" b="1" i="1" dirty="0" smtClean="0"/>
+                        <a:rPr lang="en-US" sz="1600" b="1" i="1" dirty="0"/>
                         <a:t>Target Tracking Processing</a:t>
                       </a:r>
                     </a:p>
@@ -4051,12 +4049,24 @@
                     <a:p>
                       <a:pPr algn="ctr"/>
                       <a:r>
-                        <a:rPr lang="en-US" sz="1200" b="1" i="1" dirty="0" smtClean="0"/>
+                        <a:rPr lang="en-US" sz="1200" b="1" i="1" dirty="0"/>
                         <a:t>Jim </a:t>
                       </a:r>
                       <a:r>
-                        <a:rPr lang="en-US" sz="1200" b="1" i="1" dirty="0" err="1" smtClean="0"/>
+                        <a:rPr lang="en-US" sz="1200" b="1" i="1" dirty="0" err="1"/>
                         <a:t>McGinness</a:t>
+                      </a:r>
+                      <a:endParaRPr lang="en-US" sz="1200" b="1" i="1" dirty="0"/>
+                    </a:p>
+                    <a:p>
+                      <a:pPr algn="ctr"/>
+                      <a:r>
+                        <a:rPr lang="en-US" sz="1200" b="1" i="1" dirty="0"/>
+                        <a:t>Joe </a:t>
+                      </a:r>
+                      <a:r>
+                        <a:rPr lang="en-US" sz="1200" b="1" i="1" dirty="0" err="1"/>
+                        <a:t>Carraccio</a:t>
                       </a:r>
                       <a:endParaRPr lang="en-US" sz="1200" b="1" i="1" dirty="0"/>
                     </a:p>
@@ -4074,6 +4084,11 @@
                   </a:txBody>
                   <a:tcPr anchor="ctr"/>
                 </a:tc>
+                <a:extLst>
+                  <a:ext uri="{0D108BD9-81ED-4DB2-BD59-A6C34878D82A}">
+                    <a16:rowId xmlns:a16="http://schemas.microsoft.com/office/drawing/2014/main" val="10005"/>
+                  </a:ext>
+                </a:extLst>
               </a:tr>
               <a:tr h="370840">
                 <a:tc>
@@ -4083,10 +4098,9 @@
                     <a:p>
                       <a:pPr algn="ctr"/>
                       <a:r>
-                        <a:rPr lang="en-US" sz="1600" b="1" i="1" dirty="0" smtClean="0"/>
+                        <a:rPr lang="en-US" sz="1600" b="1" i="1" dirty="0"/>
                         <a:t>Autonomous Modes</a:t>
                       </a:r>
-                      <a:endParaRPr lang="en-US" sz="1600" b="1" i="1" dirty="0"/>
                     </a:p>
                   </a:txBody>
                   <a:tcPr anchor="ctr"/>
@@ -4114,7 +4128,7 @@
                         <a:defRPr/>
                       </a:pPr>
                       <a:r>
-                        <a:rPr lang="en-US" sz="1600" b="1" i="1" dirty="0" smtClean="0"/>
+                        <a:rPr lang="en-US" sz="1600" b="1" i="1" dirty="0"/>
                         <a:t>Motion Planning (Navigation)</a:t>
                       </a:r>
                     </a:p>
@@ -4137,7 +4151,7 @@
                         <a:defRPr/>
                       </a:pPr>
                       <a:r>
-                        <a:rPr lang="en-US" sz="1600" b="1" i="1" dirty="0" smtClean="0"/>
+                        <a:rPr lang="en-US" sz="1600" b="1" i="1" dirty="0"/>
                         <a:t>Articulation Sequences</a:t>
                       </a:r>
                     </a:p>
@@ -4160,7 +4174,7 @@
                         <a:defRPr/>
                       </a:pPr>
                       <a:r>
-                        <a:rPr lang="en-US" sz="1600" b="1" i="1" dirty="0" smtClean="0"/>
+                        <a:rPr lang="en-US" sz="1600" b="1" i="1" dirty="0"/>
                         <a:t>Sensor Processing </a:t>
                       </a:r>
                     </a:p>
@@ -4174,17 +4188,16 @@
                     <a:p>
                       <a:pPr algn="ctr"/>
                       <a:r>
-                        <a:rPr lang="en-US" sz="1200" b="1" i="1" dirty="0" smtClean="0"/>
+                        <a:rPr lang="en-US" sz="1200" b="1" i="1" dirty="0"/>
                         <a:t>Jay Hinspeter</a:t>
                       </a:r>
                     </a:p>
                     <a:p>
                       <a:pPr algn="ctr"/>
                       <a:r>
-                        <a:rPr lang="en-US" sz="1200" b="1" i="1" dirty="0" smtClean="0"/>
+                        <a:rPr lang="en-US" sz="1200" b="1" i="1" dirty="0"/>
                         <a:t>Brad Hunter</a:t>
                       </a:r>
-                      <a:endParaRPr lang="en-US" sz="1200" b="1" i="1" dirty="0"/>
                     </a:p>
                   </a:txBody>
                   <a:tcPr anchor="ctr"/>
@@ -4195,11 +4208,19 @@
                     <a:lstStyle/>
                     <a:p>
                       <a:pPr algn="ctr"/>
-                      <a:endParaRPr lang="en-US" sz="1200" b="1" i="1" dirty="0"/>
+                      <a:r>
+                        <a:rPr lang="en-US" sz="1200" b="1" i="1" dirty="0"/>
+                        <a:t>Liam</a:t>
+                      </a:r>
                     </a:p>
                   </a:txBody>
                   <a:tcPr anchor="ctr"/>
                 </a:tc>
+                <a:extLst>
+                  <a:ext uri="{0D108BD9-81ED-4DB2-BD59-A6C34878D82A}">
+                    <a16:rowId xmlns:a16="http://schemas.microsoft.com/office/drawing/2014/main" val="10006"/>
+                  </a:ext>
+                </a:extLst>
               </a:tr>
               <a:tr h="370840">
                 <a:tc>
@@ -4209,10 +4230,9 @@
                     <a:p>
                       <a:pPr algn="ctr"/>
                       <a:r>
-                        <a:rPr lang="en-US" sz="1600" b="1" i="1" dirty="0" smtClean="0"/>
+                        <a:rPr lang="en-US" sz="1600" b="1" i="1" dirty="0"/>
                         <a:t>Scouting App</a:t>
                       </a:r>
-                      <a:endParaRPr lang="en-US" sz="1600" b="1" i="1" dirty="0"/>
                     </a:p>
                   </a:txBody>
                   <a:tcPr anchor="ctr"/>
@@ -4240,7 +4260,7 @@
                         <a:defRPr/>
                       </a:pPr>
                       <a:r>
-                        <a:rPr lang="en-US" sz="1600" b="1" i="1" dirty="0" smtClean="0"/>
+                        <a:rPr lang="en-US" sz="1600" b="1" i="1" dirty="0"/>
                         <a:t>Develop / Extend Scouting App</a:t>
                       </a:r>
                     </a:p>
@@ -4263,14 +4283,14 @@
                         <a:defRPr/>
                       </a:pPr>
                       <a:r>
-                        <a:rPr lang="en-US" sz="1600" b="1" i="1" dirty="0" smtClean="0"/>
+                        <a:rPr lang="en-US" sz="1600" b="1" i="1" dirty="0"/>
                         <a:t>based</a:t>
                       </a:r>
                       <a:r>
-                        <a:rPr lang="en-US" sz="1600" b="1" i="1" baseline="0" dirty="0" smtClean="0"/>
+                        <a:rPr lang="en-US" sz="1600" b="1" i="1" baseline="0" dirty="0"/>
                         <a:t> on Game Features</a:t>
                       </a:r>
-                      <a:endParaRPr lang="en-US" sz="1600" b="1" i="1" dirty="0" smtClean="0"/>
+                      <a:endParaRPr lang="en-US" sz="1600" b="1" i="1" dirty="0"/>
                     </a:p>
                   </a:txBody>
                   <a:tcPr anchor="ctr"/>
@@ -4281,6 +4301,14 @@
                     <a:lstStyle/>
                     <a:p>
                       <a:pPr algn="ctr"/>
+                      <a:r>
+                        <a:rPr lang="en-US" sz="1200" b="1" i="1" dirty="0"/>
+                        <a:t>Jay </a:t>
+                      </a:r>
+                      <a:r>
+                        <a:rPr lang="en-US" sz="1200" b="1" i="1" dirty="0" err="1"/>
+                        <a:t>Hinspeter</a:t>
+                      </a:r>
                       <a:endParaRPr lang="en-US" sz="1200" b="1" i="1" dirty="0"/>
                     </a:p>
                   </a:txBody>
@@ -4292,11 +4320,19 @@
                     <a:lstStyle/>
                     <a:p>
                       <a:pPr algn="ctr"/>
-                      <a:endParaRPr lang="en-US" sz="1200" b="1" i="1" dirty="0"/>
+                      <a:r>
+                        <a:rPr lang="en-US" sz="1200" b="1" i="1" dirty="0"/>
+                        <a:t>Chris Giordano</a:t>
+                      </a:r>
                     </a:p>
                   </a:txBody>
                   <a:tcPr anchor="ctr"/>
                 </a:tc>
+                <a:extLst>
+                  <a:ext uri="{0D108BD9-81ED-4DB2-BD59-A6C34878D82A}">
+                    <a16:rowId xmlns:a16="http://schemas.microsoft.com/office/drawing/2014/main" val="10007"/>
+                  </a:ext>
+                </a:extLst>
               </a:tr>
             </a:tbl>
           </a:graphicData>
@@ -4312,13 +4348,6 @@
   <p:clrMapOvr>
     <a:masterClrMapping/>
   </p:clrMapOvr>
-  <p:timing>
-    <p:tnLst>
-      <p:par>
-        <p:cTn id="1" dur="indefinite" restart="never" nodeType="tmRoot"/>
-      </p:par>
-    </p:tnLst>
-  </p:timing>
 </p:sld>
 </file>
 

</xml_diff>

<commit_message>
Updating Mentors and Students
</commit_message>
<xml_diff>
--- a/Software Team Roles and Responsibilities.pptx
+++ b/Software Team Roles and Responsibilities.pptx
@@ -3456,7 +3456,7 @@
           <p:nvPr>
             <p:extLst>
               <p:ext uri="{D42A27DB-BD31-4B8C-83A1-F6EECF244321}">
-                <p14:modId xmlns:p14="http://schemas.microsoft.com/office/powerpoint/2010/main" val="2848295500"/>
+                <p14:modId xmlns:p14="http://schemas.microsoft.com/office/powerpoint/2010/main" val="1345358431"/>
               </p:ext>
             </p:extLst>
           </p:nvPr>
@@ -3475,28 +3475,28 @@
                 <a:gridCol w="1645920">
                   <a:extLst>
                     <a:ext uri="{9D8B030D-6E8A-4147-A177-3AD203B41FA5}">
-                      <a16:colId xmlns:a16="http://schemas.microsoft.com/office/drawing/2014/main" val="20000"/>
+                      <a16:colId xmlns:a16="http://schemas.microsoft.com/office/drawing/2014/main" xmlns="" val="20000"/>
                     </a:ext>
                   </a:extLst>
                 </a:gridCol>
                 <a:gridCol w="4297680">
                   <a:extLst>
                     <a:ext uri="{9D8B030D-6E8A-4147-A177-3AD203B41FA5}">
-                      <a16:colId xmlns:a16="http://schemas.microsoft.com/office/drawing/2014/main" val="20001"/>
+                      <a16:colId xmlns:a16="http://schemas.microsoft.com/office/drawing/2014/main" xmlns="" val="20001"/>
                     </a:ext>
                   </a:extLst>
                 </a:gridCol>
                 <a:gridCol w="1554480">
                   <a:extLst>
                     <a:ext uri="{9D8B030D-6E8A-4147-A177-3AD203B41FA5}">
-                      <a16:colId xmlns:a16="http://schemas.microsoft.com/office/drawing/2014/main" val="20002"/>
+                      <a16:colId xmlns:a16="http://schemas.microsoft.com/office/drawing/2014/main" xmlns="" val="20002"/>
                     </a:ext>
                   </a:extLst>
                 </a:gridCol>
                 <a:gridCol w="1554480">
                   <a:extLst>
                     <a:ext uri="{9D8B030D-6E8A-4147-A177-3AD203B41FA5}">
-                      <a16:colId xmlns:a16="http://schemas.microsoft.com/office/drawing/2014/main" val="20003"/>
+                      <a16:colId xmlns:a16="http://schemas.microsoft.com/office/drawing/2014/main" xmlns="" val="20003"/>
                     </a:ext>
                   </a:extLst>
                 </a:gridCol>
@@ -3560,7 +3560,7 @@
                 </a:tc>
                 <a:extLst>
                   <a:ext uri="{0D108BD9-81ED-4DB2-BD59-A6C34878D82A}">
-                    <a16:rowId xmlns:a16="http://schemas.microsoft.com/office/drawing/2014/main" val="10000"/>
+                    <a16:rowId xmlns:a16="http://schemas.microsoft.com/office/drawing/2014/main" xmlns="" val="10000"/>
                   </a:ext>
                 </a:extLst>
               </a:tr>
@@ -3606,92 +3606,6 @@
                     <a:lstStyle/>
                     <a:p>
                       <a:pPr algn="ctr"/>
-                      <a:r>
-                        <a:rPr lang="en-US" sz="1200" b="1" i="1" dirty="0"/>
-                        <a:t>John Foster</a:t>
-                      </a:r>
-                    </a:p>
-                  </a:txBody>
-                  <a:tcPr anchor="ctr"/>
-                </a:tc>
-                <a:tc>
-                  <a:txBody>
-                    <a:bodyPr/>
-                    <a:lstStyle/>
-                    <a:p>
-                      <a:pPr algn="ctr"/>
-                      <a:endParaRPr lang="en-US" sz="1200" b="1" i="1" dirty="0"/>
-                    </a:p>
-                  </a:txBody>
-                  <a:tcPr anchor="ctr"/>
-                </a:tc>
-                <a:extLst>
-                  <a:ext uri="{0D108BD9-81ED-4DB2-BD59-A6C34878D82A}">
-                    <a16:rowId xmlns:a16="http://schemas.microsoft.com/office/drawing/2014/main" val="10001"/>
-                  </a:ext>
-                </a:extLst>
-              </a:tr>
-              <a:tr h="370840">
-                <a:tc>
-                  <a:txBody>
-                    <a:bodyPr/>
-                    <a:lstStyle/>
-                    <a:p>
-                      <a:pPr algn="ctr"/>
-                      <a:r>
-                        <a:rPr lang="en-US" sz="1600" b="1" i="1" dirty="0"/>
-                        <a:t>Drive </a:t>
-                      </a:r>
-                    </a:p>
-                    <a:p>
-                      <a:pPr algn="ctr"/>
-                      <a:r>
-                        <a:rPr lang="en-US" sz="1600" b="1" i="1" dirty="0"/>
-                        <a:t>Control</a:t>
-                      </a:r>
-                    </a:p>
-                  </a:txBody>
-                  <a:tcPr anchor="ctr"/>
-                </a:tc>
-                <a:tc>
-                  <a:txBody>
-                    <a:bodyPr/>
-                    <a:lstStyle/>
-                    <a:p>
-                      <a:pPr algn="ctr"/>
-                      <a:r>
-                        <a:rPr lang="en-US" sz="1600" b="1" i="1" dirty="0"/>
-                        <a:t>Drive Control</a:t>
-                      </a:r>
-                      <a:r>
-                        <a:rPr lang="en-US" sz="1600" b="1" i="1" baseline="0" dirty="0"/>
-                        <a:t> S/W </a:t>
-                      </a:r>
-                    </a:p>
-                    <a:p>
-                      <a:pPr algn="ctr"/>
-                      <a:r>
-                        <a:rPr lang="en-US" sz="1600" b="1" i="1" baseline="0" dirty="0"/>
-                        <a:t>Driver Controller Interface</a:t>
-                      </a:r>
-                    </a:p>
-                  </a:txBody>
-                  <a:tcPr anchor="ctr"/>
-                </a:tc>
-                <a:tc>
-                  <a:txBody>
-                    <a:bodyPr/>
-                    <a:lstStyle/>
-                    <a:p>
-                      <a:pPr algn="ctr"/>
-                      <a:r>
-                        <a:rPr lang="en-US" sz="1200" b="1" i="1"/>
-                        <a:t>Brad</a:t>
-                      </a:r>
-                      <a:r>
-                        <a:rPr lang="en-US" sz="1200" b="1" i="1" baseline="0"/>
-                        <a:t> Hunter</a:t>
-                      </a:r>
                       <a:endParaRPr lang="en-US" sz="1200" b="1" i="1" dirty="0"/>
                     </a:p>
                   </a:txBody>
@@ -3710,7 +3624,105 @@
                 </a:tc>
                 <a:extLst>
                   <a:ext uri="{0D108BD9-81ED-4DB2-BD59-A6C34878D82A}">
-                    <a16:rowId xmlns:a16="http://schemas.microsoft.com/office/drawing/2014/main" val="10002"/>
+                    <a16:rowId xmlns:a16="http://schemas.microsoft.com/office/drawing/2014/main" xmlns="" val="10001"/>
+                  </a:ext>
+                </a:extLst>
+              </a:tr>
+              <a:tr h="370840">
+                <a:tc>
+                  <a:txBody>
+                    <a:bodyPr/>
+                    <a:lstStyle/>
+                    <a:p>
+                      <a:pPr algn="ctr"/>
+                      <a:r>
+                        <a:rPr lang="en-US" sz="1600" b="1" i="1" dirty="0"/>
+                        <a:t>Drive </a:t>
+                      </a:r>
+                    </a:p>
+                    <a:p>
+                      <a:pPr algn="ctr"/>
+                      <a:r>
+                        <a:rPr lang="en-US" sz="1600" b="1" i="1" dirty="0"/>
+                        <a:t>Control</a:t>
+                      </a:r>
+                    </a:p>
+                  </a:txBody>
+                  <a:tcPr anchor="ctr"/>
+                </a:tc>
+                <a:tc>
+                  <a:txBody>
+                    <a:bodyPr/>
+                    <a:lstStyle/>
+                    <a:p>
+                      <a:pPr algn="ctr"/>
+                      <a:r>
+                        <a:rPr lang="en-US" sz="1600" b="1" i="1" dirty="0"/>
+                        <a:t>Drive Control</a:t>
+                      </a:r>
+                      <a:r>
+                        <a:rPr lang="en-US" sz="1600" b="1" i="1" baseline="0" dirty="0"/>
+                        <a:t> S/W </a:t>
+                      </a:r>
+                    </a:p>
+                    <a:p>
+                      <a:pPr algn="ctr"/>
+                      <a:r>
+                        <a:rPr lang="en-US" sz="1600" b="1" i="1" baseline="0" dirty="0"/>
+                        <a:t>Driver Controller Interface</a:t>
+                      </a:r>
+                    </a:p>
+                  </a:txBody>
+                  <a:tcPr anchor="ctr"/>
+                </a:tc>
+                <a:tc>
+                  <a:txBody>
+                    <a:bodyPr/>
+                    <a:lstStyle/>
+                    <a:p>
+                      <a:pPr algn="ctr"/>
+                      <a:r>
+                        <a:rPr lang="en-US" sz="1200" b="1" i="1" dirty="0"/>
+                        <a:t>Brad</a:t>
+                      </a:r>
+                      <a:r>
+                        <a:rPr lang="en-US" sz="1200" b="1" i="1" baseline="0" dirty="0"/>
+                        <a:t> </a:t>
+                      </a:r>
+                      <a:r>
+                        <a:rPr lang="en-US" sz="1200" b="1" i="1" baseline="0" dirty="0" smtClean="0"/>
+                        <a:t>Hunter</a:t>
+                      </a:r>
+                    </a:p>
+                    <a:p>
+                      <a:pPr algn="ctr"/>
+                      <a:r>
+                        <a:rPr lang="en-US" sz="1200" b="1" i="1" baseline="0" dirty="0" smtClean="0"/>
+                        <a:t>Jay Hinspeter</a:t>
+                      </a:r>
+                      <a:endParaRPr lang="en-US" sz="1200" b="1" i="1" dirty="0"/>
+                    </a:p>
+                  </a:txBody>
+                  <a:tcPr anchor="ctr"/>
+                </a:tc>
+                <a:tc>
+                  <a:txBody>
+                    <a:bodyPr/>
+                    <a:lstStyle/>
+                    <a:p>
+                      <a:pPr algn="ctr"/>
+                      <a:r>
+                        <a:rPr lang="en-US" sz="1200" b="1" i="1" dirty="0" smtClean="0"/>
+                        <a:t>Henry Bennett</a:t>
+                      </a:r>
+                      <a:endParaRPr lang="en-US" sz="1200" b="1" i="1" dirty="0"/>
+                    </a:p>
+                  </a:txBody>
+                  <a:tcPr anchor="ctr"/>
+                </a:tc>
+                <a:extLst>
+                  <a:ext uri="{0D108BD9-81ED-4DB2-BD59-A6C34878D82A}">
+                    <a16:rowId xmlns:a16="http://schemas.microsoft.com/office/drawing/2014/main" xmlns="" val="10002"/>
                   </a:ext>
                 </a:extLst>
               </a:tr>
@@ -3825,7 +3837,7 @@
                 </a:tc>
                 <a:extLst>
                   <a:ext uri="{0D108BD9-81ED-4DB2-BD59-A6C34878D82A}">
-                    <a16:rowId xmlns:a16="http://schemas.microsoft.com/office/drawing/2014/main" val="10003"/>
+                    <a16:rowId xmlns:a16="http://schemas.microsoft.com/office/drawing/2014/main" xmlns="" val="10003"/>
                   </a:ext>
                 </a:extLst>
               </a:tr>
@@ -3940,6 +3952,10 @@
                     <a:lstStyle/>
                     <a:p>
                       <a:pPr algn="ctr"/>
+                      <a:r>
+                        <a:rPr lang="en-US" sz="1200" b="1" i="1" dirty="0" smtClean="0"/>
+                        <a:t>Liam Daley</a:t>
+                      </a:r>
                       <a:endParaRPr lang="en-US" sz="1200" b="1" i="1" dirty="0"/>
                     </a:p>
                   </a:txBody>
@@ -3947,7 +3963,7 @@
                 </a:tc>
                 <a:extLst>
                   <a:ext uri="{0D108BD9-81ED-4DB2-BD59-A6C34878D82A}">
-                    <a16:rowId xmlns:a16="http://schemas.microsoft.com/office/drawing/2014/main" val="10004"/>
+                    <a16:rowId xmlns:a16="http://schemas.microsoft.com/office/drawing/2014/main" xmlns="" val="10004"/>
                   </a:ext>
                 </a:extLst>
               </a:tr>
@@ -4053,8 +4069,16 @@
                         <a:t>Jim </a:t>
                       </a:r>
                       <a:r>
-                        <a:rPr lang="en-US" sz="1200" b="1" i="1" dirty="0" err="1"/>
+                        <a:rPr lang="en-US" sz="1200" b="1" i="1" dirty="0" err="1" smtClean="0"/>
                         <a:t>McGinness</a:t>
+                      </a:r>
+                      <a:endParaRPr lang="en-US" sz="1200" b="1" i="1" dirty="0" smtClean="0"/>
+                    </a:p>
+                    <a:p>
+                      <a:pPr algn="ctr"/>
+                      <a:r>
+                        <a:rPr lang="en-US" sz="1200" b="1" i="1" dirty="0" smtClean="0"/>
+                        <a:t>Jeff Bryant</a:t>
                       </a:r>
                       <a:endParaRPr lang="en-US" sz="1200" b="1" i="1" dirty="0"/>
                     </a:p>
@@ -4079,6 +4103,14 @@
                     <a:lstStyle/>
                     <a:p>
                       <a:pPr algn="ctr"/>
+                      <a:r>
+                        <a:rPr lang="en-US" sz="1200" b="1" i="1" dirty="0" smtClean="0"/>
+                        <a:t>John </a:t>
+                      </a:r>
+                      <a:r>
+                        <a:rPr lang="en-US" sz="1200" b="1" i="1" dirty="0" err="1" smtClean="0"/>
+                        <a:t>Dutile</a:t>
+                      </a:r>
                       <a:endParaRPr lang="en-US" sz="1200" b="1" i="1" dirty="0"/>
                     </a:p>
                   </a:txBody>
@@ -4086,7 +4118,7 @@
                 </a:tc>
                 <a:extLst>
                   <a:ext uri="{0D108BD9-81ED-4DB2-BD59-A6C34878D82A}">
-                    <a16:rowId xmlns:a16="http://schemas.microsoft.com/office/drawing/2014/main" val="10005"/>
+                    <a16:rowId xmlns:a16="http://schemas.microsoft.com/office/drawing/2014/main" xmlns="" val="10005"/>
                   </a:ext>
                 </a:extLst>
               </a:tr>
@@ -4209,16 +4241,24 @@
                     <a:p>
                       <a:pPr algn="ctr"/>
                       <a:r>
-                        <a:rPr lang="en-US" sz="1200" b="1" i="1" dirty="0"/>
-                        <a:t>Liam</a:t>
-                      </a:r>
+                        <a:rPr lang="en-US" sz="1200" b="1" i="1" dirty="0" smtClean="0"/>
+                        <a:t>Liam Daley</a:t>
+                      </a:r>
+                    </a:p>
+                    <a:p>
+                      <a:pPr algn="ctr"/>
+                      <a:r>
+                        <a:rPr lang="en-US" sz="1200" b="1" i="1" dirty="0" smtClean="0"/>
+                        <a:t>Kaylyn Dickinson</a:t>
+                      </a:r>
+                      <a:endParaRPr lang="en-US" sz="1200" b="1" i="1" dirty="0"/>
                     </a:p>
                   </a:txBody>
                   <a:tcPr anchor="ctr"/>
                 </a:tc>
                 <a:extLst>
                   <a:ext uri="{0D108BD9-81ED-4DB2-BD59-A6C34878D82A}">
-                    <a16:rowId xmlns:a16="http://schemas.microsoft.com/office/drawing/2014/main" val="10006"/>
+                    <a16:rowId xmlns:a16="http://schemas.microsoft.com/office/drawing/2014/main" xmlns="" val="10006"/>
                   </a:ext>
                 </a:extLst>
               </a:tr>
@@ -4302,12 +4342,8 @@
                     <a:p>
                       <a:pPr algn="ctr"/>
                       <a:r>
-                        <a:rPr lang="en-US" sz="1200" b="1" i="1" dirty="0"/>
-                        <a:t>Jay </a:t>
-                      </a:r>
-                      <a:r>
-                        <a:rPr lang="en-US" sz="1200" b="1" i="1" dirty="0" err="1"/>
-                        <a:t>Hinspeter</a:t>
+                        <a:rPr lang="en-US" sz="1200" b="1" i="1" dirty="0" smtClean="0"/>
+                        <a:t>John Foster</a:t>
                       </a:r>
                       <a:endParaRPr lang="en-US" sz="1200" b="1" i="1" dirty="0"/>
                     </a:p>
@@ -4322,15 +4358,27 @@
                       <a:pPr algn="ctr"/>
                       <a:r>
                         <a:rPr lang="en-US" sz="1200" b="1" i="1" dirty="0"/>
-                        <a:t>Chris Giordano</a:t>
-                      </a:r>
+                        <a:t>Chris </a:t>
+                      </a:r>
+                      <a:r>
+                        <a:rPr lang="en-US" sz="1200" b="1" i="1" dirty="0" smtClean="0"/>
+                        <a:t>Giordano</a:t>
+                      </a:r>
+                    </a:p>
+                    <a:p>
+                      <a:pPr algn="ctr"/>
+                      <a:r>
+                        <a:rPr lang="en-US" sz="1200" b="1" i="1" dirty="0" smtClean="0"/>
+                        <a:t>Leah Dibble</a:t>
+                      </a:r>
+                      <a:endParaRPr lang="en-US" sz="1200" b="1" i="1" dirty="0"/>
                     </a:p>
                   </a:txBody>
                   <a:tcPr anchor="ctr"/>
                 </a:tc>
                 <a:extLst>
                   <a:ext uri="{0D108BD9-81ED-4DB2-BD59-A6C34878D82A}">
-                    <a16:rowId xmlns:a16="http://schemas.microsoft.com/office/drawing/2014/main" val="10007"/>
+                    <a16:rowId xmlns:a16="http://schemas.microsoft.com/office/drawing/2014/main" xmlns="" val="10007"/>
                   </a:ext>
                 </a:extLst>
               </a:tr>

</xml_diff>